<commit_message>
Made changes and committed files.
</commit_message>
<xml_diff>
--- a/Data Task.pptx
+++ b/Data Task.pptx
@@ -5208,7 +5208,7 @@
               <a:rPr lang="en-US" sz="2400" b="1" dirty="0">
                 <a:latin typeface="Bahnschrift Condensed" panose="020B0502040204020203" pitchFamily="34" charset="0"/>
               </a:rPr>
-              <a:t>Data normalization</a:t>
+              <a:t>Data normalisation</a:t>
             </a:r>
           </a:p>
           <a:p>
@@ -5570,7 +5570,7 @@
               <a:rPr lang="en-US" b="1" dirty="0">
                 <a:latin typeface="Bahnschrift Condensed" panose="020B0502040204020203" pitchFamily="34" charset="0"/>
               </a:rPr>
-              <a:t>Data normalization……</a:t>
+              <a:t>Data normalisation……</a:t>
             </a:r>
           </a:p>
           <a:p>
@@ -5944,7 +5944,7 @@
               <a:rPr lang="en-US" b="1" dirty="0">
                 <a:latin typeface="Bahnschrift Condensed" panose="020B0502040204020203" pitchFamily="34" charset="0"/>
               </a:rPr>
-              <a:t>Data normalization (applying filers)……</a:t>
+              <a:t>Data normalisation (applying filers)……</a:t>
             </a:r>
           </a:p>
           <a:p>
@@ -6294,7 +6294,7 @@
               <a:rPr lang="en-US" sz="2400" b="1" dirty="0">
                 <a:latin typeface="Bahnschrift Condensed" panose="020B0502040204020203" pitchFamily="34" charset="0"/>
               </a:rPr>
-              <a:t>Data normalization</a:t>
+              <a:t>Data normalisation</a:t>
             </a:r>
             <a:r>
               <a:rPr lang="en-US" b="1" dirty="0">
@@ -9587,7 +9587,7 @@
               <a:rPr lang="en-US" dirty="0">
                 <a:latin typeface="Bahnschrift Condensed" panose="020B0502040204020203" pitchFamily="34" charset="0"/>
               </a:rPr>
-              <a:t> (output) file (target data.xlsx) with 3 tabs i.e. pre-processing, normalization and integration, via </a:t>
+              <a:t> (output) file (target data.xlsx) with 3 tabs i.e. pre-processing, normalisation and integration, via </a:t>
             </a:r>
             <a:r>
               <a:rPr lang="en-US" b="1" dirty="0">

</xml_diff>